<commit_message>
updated report images and slide
</commit_message>
<xml_diff>
--- a/Mid-term Presentation.pptx
+++ b/Mid-term Presentation.pptx
@@ -325,7 +325,7 @@
               <a:pPr>
                 <a:defRPr/>
               </a:pPr>
-              <a:t>12/08/2024</a:t>
+              <a:t>13/08/2024</a:t>
             </a:fld>
             <a:endParaRPr lang="en-GB"/>
           </a:p>
@@ -544,7 +544,7 @@
               <a:pPr>
                 <a:defRPr/>
               </a:pPr>
-              <a:t>12/08/2024</a:t>
+              <a:t>13/08/2024</a:t>
             </a:fld>
             <a:endParaRPr lang="en-GB"/>
           </a:p>
@@ -20586,6 +20586,1788 @@
           </a:p>
         </p:txBody>
       </p:sp>
+      <p:grpSp>
+        <p:nvGrpSpPr>
+          <p:cNvPr id="71" name="Group 70">
+            <a:extLst>
+              <a:ext uri="{FF2B5EF4-FFF2-40B4-BE49-F238E27FC236}">
+                <a16:creationId xmlns:a16="http://schemas.microsoft.com/office/drawing/2014/main" id="{7A1C47DB-C79E-0FB3-4598-560BD2B6E5DB}"/>
+              </a:ext>
+            </a:extLst>
+          </p:cNvPr>
+          <p:cNvGrpSpPr/>
+          <p:nvPr/>
+        </p:nvGrpSpPr>
+        <p:grpSpPr>
+          <a:xfrm>
+            <a:off x="2647394" y="1965045"/>
+            <a:ext cx="6177516" cy="2307265"/>
+            <a:chOff x="1541721" y="1892595"/>
+            <a:chExt cx="6177516" cy="2307265"/>
+          </a:xfrm>
+        </p:grpSpPr>
+        <p:sp>
+          <p:nvSpPr>
+            <p:cNvPr id="70" name="Rectangle 69">
+              <a:extLst>
+                <a:ext uri="{FF2B5EF4-FFF2-40B4-BE49-F238E27FC236}">
+                  <a16:creationId xmlns:a16="http://schemas.microsoft.com/office/drawing/2014/main" id="{891E0EBD-037A-DC15-8561-9E0CD31087D7}"/>
+                </a:ext>
+              </a:extLst>
+            </p:cNvPr>
+            <p:cNvSpPr/>
+            <p:nvPr/>
+          </p:nvSpPr>
+          <p:spPr>
+            <a:xfrm>
+              <a:off x="1541721" y="1892595"/>
+              <a:ext cx="6177516" cy="2307265"/>
+            </a:xfrm>
+            <a:prstGeom prst="rect">
+              <a:avLst/>
+            </a:prstGeom>
+            <a:solidFill>
+              <a:schemeClr val="bg1"/>
+            </a:solidFill>
+            <a:ln>
+              <a:noFill/>
+            </a:ln>
+          </p:spPr>
+          <p:style>
+            <a:lnRef idx="2">
+              <a:schemeClr val="accent1">
+                <a:shade val="50000"/>
+              </a:schemeClr>
+            </a:lnRef>
+            <a:fillRef idx="1">
+              <a:schemeClr val="accent1"/>
+            </a:fillRef>
+            <a:effectRef idx="0">
+              <a:schemeClr val="accent1"/>
+            </a:effectRef>
+            <a:fontRef idx="minor">
+              <a:schemeClr val="lt1"/>
+            </a:fontRef>
+          </p:style>
+          <p:txBody>
+            <a:bodyPr rot="0" spcFirstLastPara="0" vertOverflow="overflow" horzOverflow="overflow" vert="horz" wrap="square" lIns="91440" tIns="45720" rIns="91440" bIns="45720" numCol="1" spcCol="0" rtlCol="0" fromWordArt="0" anchor="t" anchorCtr="0" forceAA="0" compatLnSpc="1">
+              <a:prstTxWarp prst="textNoShape">
+                <a:avLst/>
+              </a:prstTxWarp>
+              <a:noAutofit/>
+            </a:bodyPr>
+            <a:lstStyle/>
+            <a:p>
+              <a:pPr algn="ctr">
+                <a:lnSpc>
+                  <a:spcPct val="114000"/>
+                </a:lnSpc>
+              </a:pPr>
+              <a:endParaRPr lang="en-GB" dirty="0"/>
+            </a:p>
+          </p:txBody>
+        </p:sp>
+        <p:grpSp>
+          <p:nvGrpSpPr>
+            <p:cNvPr id="8" name="Group 7">
+              <a:extLst>
+                <a:ext uri="{FF2B5EF4-FFF2-40B4-BE49-F238E27FC236}">
+                  <a16:creationId xmlns:a16="http://schemas.microsoft.com/office/drawing/2014/main" id="{D6C57025-57DC-B41F-1276-4A6664B7CA81}"/>
+                </a:ext>
+              </a:extLst>
+            </p:cNvPr>
+            <p:cNvGrpSpPr/>
+            <p:nvPr/>
+          </p:nvGrpSpPr>
+          <p:grpSpPr>
+            <a:xfrm>
+              <a:off x="1828800" y="2076843"/>
+              <a:ext cx="5759559" cy="989814"/>
+              <a:chOff x="1828800" y="2076843"/>
+              <a:chExt cx="5759559" cy="989814"/>
+            </a:xfrm>
+          </p:grpSpPr>
+          <p:sp>
+            <p:nvSpPr>
+              <p:cNvPr id="5" name="Rounded Rectangle 4">
+                <a:extLst>
+                  <a:ext uri="{FF2B5EF4-FFF2-40B4-BE49-F238E27FC236}">
+                    <a16:creationId xmlns:a16="http://schemas.microsoft.com/office/drawing/2014/main" id="{0BB25CEE-0CCC-8454-B4A3-FDD0C6630DEC}"/>
+                  </a:ext>
+                </a:extLst>
+              </p:cNvPr>
+              <p:cNvSpPr/>
+              <p:nvPr/>
+            </p:nvSpPr>
+            <p:spPr>
+              <a:xfrm>
+                <a:off x="1828800" y="2076843"/>
+                <a:ext cx="5759559" cy="989814"/>
+              </a:xfrm>
+              <a:prstGeom prst="roundRect">
+                <a:avLst/>
+              </a:prstGeom>
+              <a:solidFill>
+                <a:schemeClr val="accent2">
+                  <a:alpha val="50000"/>
+                </a:schemeClr>
+              </a:solidFill>
+              <a:ln>
+                <a:noFill/>
+              </a:ln>
+            </p:spPr>
+            <p:style>
+              <a:lnRef idx="0">
+                <a:scrgbClr r="0" g="0" b="0"/>
+              </a:lnRef>
+              <a:fillRef idx="0">
+                <a:scrgbClr r="0" g="0" b="0"/>
+              </a:fillRef>
+              <a:effectRef idx="0">
+                <a:scrgbClr r="0" g="0" b="0"/>
+              </a:effectRef>
+              <a:fontRef idx="minor">
+                <a:schemeClr val="lt1"/>
+              </a:fontRef>
+            </p:style>
+            <p:txBody>
+              <a:bodyPr rot="0" spcFirstLastPara="0" vertOverflow="overflow" horzOverflow="overflow" vert="horz" wrap="square" lIns="91440" tIns="45720" rIns="91440" bIns="45720" numCol="1" spcCol="0" rtlCol="0" fromWordArt="0" anchor="t" anchorCtr="0" forceAA="0" compatLnSpc="1">
+                <a:prstTxWarp prst="textNoShape">
+                  <a:avLst/>
+                </a:prstTxWarp>
+                <a:noAutofit/>
+              </a:bodyPr>
+              <a:lstStyle/>
+              <a:p>
+                <a:pPr algn="ctr">
+                  <a:lnSpc>
+                    <a:spcPct val="114000"/>
+                  </a:lnSpc>
+                </a:pPr>
+                <a:endParaRPr lang="en-GB" dirty="0"/>
+              </a:p>
+            </p:txBody>
+          </p:sp>
+          <p:sp>
+            <p:nvSpPr>
+              <p:cNvPr id="7" name="TextBox 6">
+                <a:extLst>
+                  <a:ext uri="{FF2B5EF4-FFF2-40B4-BE49-F238E27FC236}">
+                    <a16:creationId xmlns:a16="http://schemas.microsoft.com/office/drawing/2014/main" id="{B23BA324-A8DB-143D-7894-9FF90ADCBF31}"/>
+                  </a:ext>
+                </a:extLst>
+              </p:cNvPr>
+              <p:cNvSpPr txBox="1"/>
+              <p:nvPr/>
+            </p:nvSpPr>
+            <p:spPr>
+              <a:xfrm>
+                <a:off x="6169729" y="2161903"/>
+                <a:ext cx="1344202" cy="257250"/>
+              </a:xfrm>
+              <a:prstGeom prst="rect">
+                <a:avLst/>
+              </a:prstGeom>
+              <a:noFill/>
+            </p:spPr>
+            <p:txBody>
+              <a:bodyPr wrap="square" lIns="0" tIns="0" rIns="0" bIns="0" rtlCol="0">
+                <a:spAutoFit/>
+              </a:bodyPr>
+              <a:lstStyle/>
+              <a:p>
+                <a:pPr>
+                  <a:lnSpc>
+                    <a:spcPct val="114000"/>
+                  </a:lnSpc>
+                </a:pPr>
+                <a:r>
+                  <a:rPr lang="en-GB" sz="1600" b="1" dirty="0">
+                    <a:solidFill>
+                      <a:schemeClr val="tx2"/>
+                    </a:solidFill>
+                    <a:latin typeface="+mn-lt"/>
+                  </a:rPr>
+                  <a:t>Environment</a:t>
+                </a:r>
+              </a:p>
+            </p:txBody>
+          </p:sp>
+        </p:grpSp>
+        <p:grpSp>
+          <p:nvGrpSpPr>
+            <p:cNvPr id="10" name="Group 9">
+              <a:extLst>
+                <a:ext uri="{FF2B5EF4-FFF2-40B4-BE49-F238E27FC236}">
+                  <a16:creationId xmlns:a16="http://schemas.microsoft.com/office/drawing/2014/main" id="{ADA9D58A-3A24-91B3-86A3-C3F8C1920F9A}"/>
+                </a:ext>
+              </a:extLst>
+            </p:cNvPr>
+            <p:cNvGrpSpPr/>
+            <p:nvPr/>
+          </p:nvGrpSpPr>
+          <p:grpSpPr>
+            <a:xfrm>
+              <a:off x="3095282" y="3368969"/>
+              <a:ext cx="2465547" cy="707336"/>
+              <a:chOff x="2635499" y="2076843"/>
+              <a:chExt cx="4990157" cy="707336"/>
+            </a:xfrm>
+          </p:grpSpPr>
+          <p:sp>
+            <p:nvSpPr>
+              <p:cNvPr id="11" name="Rounded Rectangle 10">
+                <a:extLst>
+                  <a:ext uri="{FF2B5EF4-FFF2-40B4-BE49-F238E27FC236}">
+                    <a16:creationId xmlns:a16="http://schemas.microsoft.com/office/drawing/2014/main" id="{5C607A80-3217-767A-5848-8624E14D61BF}"/>
+                  </a:ext>
+                </a:extLst>
+              </p:cNvPr>
+              <p:cNvSpPr/>
+              <p:nvPr/>
+            </p:nvSpPr>
+            <p:spPr>
+              <a:xfrm>
+                <a:off x="2635499" y="2076843"/>
+                <a:ext cx="4990157" cy="707336"/>
+              </a:xfrm>
+              <a:prstGeom prst="roundRect">
+                <a:avLst/>
+              </a:prstGeom>
+              <a:solidFill>
+                <a:schemeClr val="accent6">
+                  <a:alpha val="25000"/>
+                </a:schemeClr>
+              </a:solidFill>
+              <a:ln>
+                <a:noFill/>
+              </a:ln>
+            </p:spPr>
+            <p:style>
+              <a:lnRef idx="0">
+                <a:scrgbClr r="0" g="0" b="0"/>
+              </a:lnRef>
+              <a:fillRef idx="0">
+                <a:scrgbClr r="0" g="0" b="0"/>
+              </a:fillRef>
+              <a:effectRef idx="0">
+                <a:scrgbClr r="0" g="0" b="0"/>
+              </a:effectRef>
+              <a:fontRef idx="minor">
+                <a:schemeClr val="lt1"/>
+              </a:fontRef>
+            </p:style>
+            <p:txBody>
+              <a:bodyPr rot="0" spcFirstLastPara="0" vertOverflow="overflow" horzOverflow="overflow" vert="horz" wrap="square" lIns="91440" tIns="45720" rIns="91440" bIns="45720" numCol="1" spcCol="0" rtlCol="0" fromWordArt="0" anchor="t" anchorCtr="0" forceAA="0" compatLnSpc="1">
+                <a:prstTxWarp prst="textNoShape">
+                  <a:avLst/>
+                </a:prstTxWarp>
+                <a:noAutofit/>
+              </a:bodyPr>
+              <a:lstStyle/>
+              <a:p>
+                <a:pPr algn="ctr">
+                  <a:lnSpc>
+                    <a:spcPct val="114000"/>
+                  </a:lnSpc>
+                </a:pPr>
+                <a:endParaRPr lang="en-GB" dirty="0">
+                  <a:solidFill>
+                    <a:schemeClr val="tx1"/>
+                  </a:solidFill>
+                </a:endParaRPr>
+              </a:p>
+            </p:txBody>
+          </p:sp>
+          <p:sp>
+            <p:nvSpPr>
+              <p:cNvPr id="12" name="TextBox 11">
+                <a:extLst>
+                  <a:ext uri="{FF2B5EF4-FFF2-40B4-BE49-F238E27FC236}">
+                    <a16:creationId xmlns:a16="http://schemas.microsoft.com/office/drawing/2014/main" id="{A1DC1FDB-804A-1025-90DF-9B015B60EF48}"/>
+                  </a:ext>
+                </a:extLst>
+              </p:cNvPr>
+              <p:cNvSpPr txBox="1"/>
+              <p:nvPr/>
+            </p:nvSpPr>
+            <p:spPr>
+              <a:xfrm>
+                <a:off x="6280555" y="2161903"/>
+                <a:ext cx="1233376" cy="257250"/>
+              </a:xfrm>
+              <a:prstGeom prst="rect">
+                <a:avLst/>
+              </a:prstGeom>
+              <a:noFill/>
+            </p:spPr>
+            <p:txBody>
+              <a:bodyPr wrap="square" lIns="0" tIns="0" rIns="0" bIns="0" rtlCol="0">
+                <a:spAutoFit/>
+              </a:bodyPr>
+              <a:lstStyle/>
+              <a:p>
+                <a:pPr algn="ctr">
+                  <a:lnSpc>
+                    <a:spcPct val="114000"/>
+                  </a:lnSpc>
+                </a:pPr>
+                <a:r>
+                  <a:rPr lang="en-GB" sz="1600" b="1" dirty="0">
+                    <a:solidFill>
+                      <a:schemeClr val="accent6"/>
+                    </a:solidFill>
+                    <a:latin typeface="+mn-lt"/>
+                  </a:rPr>
+                  <a:t>Agent</a:t>
+                </a:r>
+              </a:p>
+            </p:txBody>
+          </p:sp>
+        </p:grpSp>
+        <p:grpSp>
+          <p:nvGrpSpPr>
+            <p:cNvPr id="16" name="Group 15">
+              <a:extLst>
+                <a:ext uri="{FF2B5EF4-FFF2-40B4-BE49-F238E27FC236}">
+                  <a16:creationId xmlns:a16="http://schemas.microsoft.com/office/drawing/2014/main" id="{D5CFA6C5-E894-DBD4-75A5-1A4F460A9024}"/>
+                </a:ext>
+              </a:extLst>
+            </p:cNvPr>
+            <p:cNvGrpSpPr/>
+            <p:nvPr/>
+          </p:nvGrpSpPr>
+          <p:grpSpPr>
+            <a:xfrm>
+              <a:off x="2797571" y="2284423"/>
+              <a:ext cx="595423" cy="590895"/>
+              <a:chOff x="1467293" y="2262904"/>
+              <a:chExt cx="595423" cy="590895"/>
+            </a:xfrm>
+          </p:grpSpPr>
+          <p:sp>
+            <p:nvSpPr>
+              <p:cNvPr id="13" name="Oval 12">
+                <a:extLst>
+                  <a:ext uri="{FF2B5EF4-FFF2-40B4-BE49-F238E27FC236}">
+                    <a16:creationId xmlns:a16="http://schemas.microsoft.com/office/drawing/2014/main" id="{539AC701-273E-C0B1-C44C-E0226DCD97EC}"/>
+                  </a:ext>
+                </a:extLst>
+              </p:cNvPr>
+              <p:cNvSpPr/>
+              <p:nvPr/>
+            </p:nvSpPr>
+            <p:spPr>
+              <a:xfrm>
+                <a:off x="1467293" y="2262904"/>
+                <a:ext cx="595423" cy="590895"/>
+              </a:xfrm>
+              <a:prstGeom prst="ellipse">
+                <a:avLst/>
+              </a:prstGeom>
+              <a:noFill/>
+              <a:ln>
+                <a:solidFill>
+                  <a:schemeClr val="accent1"/>
+                </a:solidFill>
+              </a:ln>
+            </p:spPr>
+            <p:style>
+              <a:lnRef idx="2">
+                <a:schemeClr val="accent1">
+                  <a:shade val="50000"/>
+                </a:schemeClr>
+              </a:lnRef>
+              <a:fillRef idx="1">
+                <a:schemeClr val="accent1"/>
+              </a:fillRef>
+              <a:effectRef idx="0">
+                <a:schemeClr val="accent1"/>
+              </a:effectRef>
+              <a:fontRef idx="minor">
+                <a:schemeClr val="lt1"/>
+              </a:fontRef>
+            </p:style>
+            <p:txBody>
+              <a:bodyPr rot="0" spcFirstLastPara="0" vertOverflow="overflow" horzOverflow="overflow" vert="horz" wrap="square" lIns="91440" tIns="45720" rIns="91440" bIns="45720" numCol="1" spcCol="0" rtlCol="0" fromWordArt="0" anchor="t" anchorCtr="0" forceAA="0" compatLnSpc="1">
+                <a:prstTxWarp prst="textNoShape">
+                  <a:avLst/>
+                </a:prstTxWarp>
+                <a:noAutofit/>
+              </a:bodyPr>
+              <a:lstStyle/>
+              <a:p>
+                <a:pPr algn="ctr">
+                  <a:lnSpc>
+                    <a:spcPct val="114000"/>
+                  </a:lnSpc>
+                </a:pPr>
+                <a:endParaRPr lang="en-GB" dirty="0"/>
+              </a:p>
+            </p:txBody>
+          </p:sp>
+          <mc:AlternateContent xmlns:mc="http://schemas.openxmlformats.org/markup-compatibility/2006">
+            <mc:Choice xmlns:a14="http://schemas.microsoft.com/office/drawing/2010/main" Requires="a14">
+              <p:sp>
+                <p:nvSpPr>
+                  <p:cNvPr id="14" name="TextBox 13">
+                    <a:extLst>
+                      <a:ext uri="{FF2B5EF4-FFF2-40B4-BE49-F238E27FC236}">
+                        <a16:creationId xmlns:a16="http://schemas.microsoft.com/office/drawing/2014/main" id="{CF932177-8DF5-CCE5-49E4-9BBE8914669F}"/>
+                      </a:ext>
+                    </a:extLst>
+                  </p:cNvPr>
+                  <p:cNvSpPr txBox="1"/>
+                  <p:nvPr/>
+                </p:nvSpPr>
+                <p:spPr>
+                  <a:xfrm>
+                    <a:off x="1622551" y="2354194"/>
+                    <a:ext cx="280269" cy="350865"/>
+                  </a:xfrm>
+                  <a:prstGeom prst="rect">
+                    <a:avLst/>
+                  </a:prstGeom>
+                  <a:noFill/>
+                </p:spPr>
+                <p:txBody>
+                  <a:bodyPr wrap="none" lIns="0" tIns="0" rIns="0" bIns="0" rtlCol="0" anchor="ctr">
+                    <a:spAutoFit/>
+                  </a:bodyPr>
+                  <a:lstStyle/>
+                  <a:p>
+                    <a:pPr>
+                      <a:lnSpc>
+                        <a:spcPct val="114000"/>
+                      </a:lnSpc>
+                    </a:pPr>
+                    <a14:m>
+                      <m:oMathPara xmlns:m="http://schemas.openxmlformats.org/officeDocument/2006/math">
+                        <m:oMathParaPr>
+                          <m:jc m:val="centerGroup"/>
+                        </m:oMathParaPr>
+                        <m:oMath xmlns:m="http://schemas.openxmlformats.org/officeDocument/2006/math">
+                          <m:sSub>
+                            <m:sSubPr>
+                              <m:ctrlPr>
+                                <a:rPr lang="en-GB" sz="2000" i="1" smtClean="0">
+                                  <a:latin typeface="Cambria Math" panose="02040503050406030204" pitchFamily="18" charset="0"/>
+                                </a:rPr>
+                              </m:ctrlPr>
+                            </m:sSubPr>
+                            <m:e>
+                              <m:r>
+                                <a:rPr lang="en-US" sz="2000" b="0" i="1" smtClean="0">
+                                  <a:latin typeface="Cambria Math" panose="02040503050406030204" pitchFamily="18" charset="0"/>
+                                </a:rPr>
+                                <m:t>𝑠</m:t>
+                              </m:r>
+                            </m:e>
+                            <m:sub>
+                              <m:r>
+                                <a:rPr lang="en-US" sz="2000" b="0" i="1" smtClean="0">
+                                  <a:latin typeface="Cambria Math" panose="02040503050406030204" pitchFamily="18" charset="0"/>
+                                </a:rPr>
+                                <m:t>𝑡</m:t>
+                              </m:r>
+                            </m:sub>
+                          </m:sSub>
+                        </m:oMath>
+                      </m:oMathPara>
+                    </a14:m>
+                    <a:endParaRPr lang="en-GB" sz="2000" dirty="0" err="1">
+                      <a:latin typeface="+mn-lt"/>
+                    </a:endParaRPr>
+                  </a:p>
+                </p:txBody>
+              </p:sp>
+            </mc:Choice>
+            <mc:Fallback>
+              <p:sp>
+                <p:nvSpPr>
+                  <p:cNvPr id="14" name="TextBox 13">
+                    <a:extLst>
+                      <a:ext uri="{FF2B5EF4-FFF2-40B4-BE49-F238E27FC236}">
+                        <a16:creationId xmlns:a16="http://schemas.microsoft.com/office/drawing/2014/main" id="{CF932177-8DF5-CCE5-49E4-9BBE8914669F}"/>
+                      </a:ext>
+                    </a:extLst>
+                  </p:cNvPr>
+                  <p:cNvSpPr txBox="1">
+                    <a:spLocks noRot="1" noChangeAspect="1" noMove="1" noResize="1" noEditPoints="1" noAdjustHandles="1" noChangeArrowheads="1" noChangeShapeType="1" noTextEdit="1"/>
+                  </p:cNvSpPr>
+                  <p:nvPr/>
+                </p:nvSpPr>
+                <p:spPr>
+                  <a:xfrm>
+                    <a:off x="1622551" y="2354194"/>
+                    <a:ext cx="280269" cy="350865"/>
+                  </a:xfrm>
+                  <a:prstGeom prst="rect">
+                    <a:avLst/>
+                  </a:prstGeom>
+                  <a:blipFill>
+                    <a:blip r:embed="rId2"/>
+                    <a:stretch>
+                      <a:fillRect l="-8696" r="-4348" b="-6897"/>
+                    </a:stretch>
+                  </a:blipFill>
+                </p:spPr>
+                <p:txBody>
+                  <a:bodyPr/>
+                  <a:lstStyle/>
+                  <a:p>
+                    <a:r>
+                      <a:rPr lang="en-GB">
+                        <a:noFill/>
+                      </a:rPr>
+                      <a:t> </a:t>
+                    </a:r>
+                  </a:p>
+                </p:txBody>
+              </p:sp>
+            </mc:Fallback>
+          </mc:AlternateContent>
+        </p:grpSp>
+        <p:grpSp>
+          <p:nvGrpSpPr>
+            <p:cNvPr id="17" name="Group 16">
+              <a:extLst>
+                <a:ext uri="{FF2B5EF4-FFF2-40B4-BE49-F238E27FC236}">
+                  <a16:creationId xmlns:a16="http://schemas.microsoft.com/office/drawing/2014/main" id="{EE545178-AD1F-C708-7B26-FE06AD375FDF}"/>
+                </a:ext>
+              </a:extLst>
+            </p:cNvPr>
+            <p:cNvGrpSpPr/>
+            <p:nvPr/>
+          </p:nvGrpSpPr>
+          <p:grpSpPr>
+            <a:xfrm>
+              <a:off x="4965407" y="2284423"/>
+              <a:ext cx="595423" cy="590895"/>
+              <a:chOff x="1467293" y="2262904"/>
+              <a:chExt cx="595423" cy="590895"/>
+            </a:xfrm>
+          </p:grpSpPr>
+          <p:sp>
+            <p:nvSpPr>
+              <p:cNvPr id="18" name="Oval 17">
+                <a:extLst>
+                  <a:ext uri="{FF2B5EF4-FFF2-40B4-BE49-F238E27FC236}">
+                    <a16:creationId xmlns:a16="http://schemas.microsoft.com/office/drawing/2014/main" id="{5D7CEFCC-3120-4857-DD64-1974A0A2CB70}"/>
+                  </a:ext>
+                </a:extLst>
+              </p:cNvPr>
+              <p:cNvSpPr/>
+              <p:nvPr/>
+            </p:nvSpPr>
+            <p:spPr>
+              <a:xfrm>
+                <a:off x="1467293" y="2262904"/>
+                <a:ext cx="595423" cy="590895"/>
+              </a:xfrm>
+              <a:prstGeom prst="ellipse">
+                <a:avLst/>
+              </a:prstGeom>
+              <a:noFill/>
+              <a:ln>
+                <a:solidFill>
+                  <a:schemeClr val="accent1"/>
+                </a:solidFill>
+              </a:ln>
+            </p:spPr>
+            <p:style>
+              <a:lnRef idx="2">
+                <a:schemeClr val="accent1">
+                  <a:shade val="50000"/>
+                </a:schemeClr>
+              </a:lnRef>
+              <a:fillRef idx="1">
+                <a:schemeClr val="accent1"/>
+              </a:fillRef>
+              <a:effectRef idx="0">
+                <a:schemeClr val="accent1"/>
+              </a:effectRef>
+              <a:fontRef idx="minor">
+                <a:schemeClr val="lt1"/>
+              </a:fontRef>
+            </p:style>
+            <p:txBody>
+              <a:bodyPr rot="0" spcFirstLastPara="0" vertOverflow="overflow" horzOverflow="overflow" vert="horz" wrap="square" lIns="91440" tIns="45720" rIns="91440" bIns="45720" numCol="1" spcCol="0" rtlCol="0" fromWordArt="0" anchor="t" anchorCtr="0" forceAA="0" compatLnSpc="1">
+                <a:prstTxWarp prst="textNoShape">
+                  <a:avLst/>
+                </a:prstTxWarp>
+                <a:noAutofit/>
+              </a:bodyPr>
+              <a:lstStyle/>
+              <a:p>
+                <a:pPr algn="ctr">
+                  <a:lnSpc>
+                    <a:spcPct val="114000"/>
+                  </a:lnSpc>
+                </a:pPr>
+                <a:endParaRPr lang="en-GB" dirty="0"/>
+              </a:p>
+            </p:txBody>
+          </p:sp>
+          <mc:AlternateContent xmlns:mc="http://schemas.openxmlformats.org/markup-compatibility/2006">
+            <mc:Choice xmlns:a14="http://schemas.microsoft.com/office/drawing/2010/main" Requires="a14">
+              <p:sp>
+                <p:nvSpPr>
+                  <p:cNvPr id="19" name="TextBox 18">
+                    <a:extLst>
+                      <a:ext uri="{FF2B5EF4-FFF2-40B4-BE49-F238E27FC236}">
+                        <a16:creationId xmlns:a16="http://schemas.microsoft.com/office/drawing/2014/main" id="{B471D11E-F3A5-7223-1052-0ADBF4B17A30}"/>
+                      </a:ext>
+                    </a:extLst>
+                  </p:cNvPr>
+                  <p:cNvSpPr txBox="1"/>
+                  <p:nvPr/>
+                </p:nvSpPr>
+                <p:spPr>
+                  <a:xfrm>
+                    <a:off x="1528017" y="2354194"/>
+                    <a:ext cx="525528" cy="350865"/>
+                  </a:xfrm>
+                  <a:prstGeom prst="rect">
+                    <a:avLst/>
+                  </a:prstGeom>
+                  <a:noFill/>
+                </p:spPr>
+                <p:txBody>
+                  <a:bodyPr wrap="none" lIns="0" tIns="0" rIns="0" bIns="0" rtlCol="0" anchor="ctr">
+                    <a:spAutoFit/>
+                  </a:bodyPr>
+                  <a:lstStyle/>
+                  <a:p>
+                    <a:pPr>
+                      <a:lnSpc>
+                        <a:spcPct val="114000"/>
+                      </a:lnSpc>
+                    </a:pPr>
+                    <a14:m>
+                      <m:oMathPara xmlns:m="http://schemas.openxmlformats.org/officeDocument/2006/math">
+                        <m:oMathParaPr>
+                          <m:jc m:val="centerGroup"/>
+                        </m:oMathParaPr>
+                        <m:oMath xmlns:m="http://schemas.openxmlformats.org/officeDocument/2006/math">
+                          <m:sSub>
+                            <m:sSubPr>
+                              <m:ctrlPr>
+                                <a:rPr lang="en-GB" sz="2000" i="1" smtClean="0">
+                                  <a:latin typeface="Cambria Math" panose="02040503050406030204" pitchFamily="18" charset="0"/>
+                                </a:rPr>
+                              </m:ctrlPr>
+                            </m:sSubPr>
+                            <m:e>
+                              <m:r>
+                                <a:rPr lang="en-US" sz="2000" b="0" i="1" smtClean="0">
+                                  <a:latin typeface="Cambria Math" panose="02040503050406030204" pitchFamily="18" charset="0"/>
+                                </a:rPr>
+                                <m:t>𝑠</m:t>
+                              </m:r>
+                            </m:e>
+                            <m:sub>
+                              <m:r>
+                                <a:rPr lang="en-US" sz="2000" b="0" i="1" smtClean="0">
+                                  <a:latin typeface="Cambria Math" panose="02040503050406030204" pitchFamily="18" charset="0"/>
+                                </a:rPr>
+                                <m:t>𝑡</m:t>
+                              </m:r>
+                              <m:r>
+                                <a:rPr lang="en-US" sz="2000" b="0" i="1" smtClean="0">
+                                  <a:latin typeface="Cambria Math" panose="02040503050406030204" pitchFamily="18" charset="0"/>
+                                </a:rPr>
+                                <m:t>+1</m:t>
+                              </m:r>
+                            </m:sub>
+                          </m:sSub>
+                        </m:oMath>
+                      </m:oMathPara>
+                    </a14:m>
+                    <a:endParaRPr lang="en-GB" sz="2000" dirty="0" err="1">
+                      <a:latin typeface="+mn-lt"/>
+                    </a:endParaRPr>
+                  </a:p>
+                </p:txBody>
+              </p:sp>
+            </mc:Choice>
+            <mc:Fallback>
+              <p:sp>
+                <p:nvSpPr>
+                  <p:cNvPr id="19" name="TextBox 18">
+                    <a:extLst>
+                      <a:ext uri="{FF2B5EF4-FFF2-40B4-BE49-F238E27FC236}">
+                        <a16:creationId xmlns:a16="http://schemas.microsoft.com/office/drawing/2014/main" id="{B471D11E-F3A5-7223-1052-0ADBF4B17A30}"/>
+                      </a:ext>
+                    </a:extLst>
+                  </p:cNvPr>
+                  <p:cNvSpPr txBox="1">
+                    <a:spLocks noRot="1" noChangeAspect="1" noMove="1" noResize="1" noEditPoints="1" noAdjustHandles="1" noChangeArrowheads="1" noChangeShapeType="1" noTextEdit="1"/>
+                  </p:cNvSpPr>
+                  <p:nvPr/>
+                </p:nvSpPr>
+                <p:spPr>
+                  <a:xfrm>
+                    <a:off x="1528017" y="2354194"/>
+                    <a:ext cx="525528" cy="350865"/>
+                  </a:xfrm>
+                  <a:prstGeom prst="rect">
+                    <a:avLst/>
+                  </a:prstGeom>
+                  <a:blipFill>
+                    <a:blip r:embed="rId3"/>
+                    <a:stretch>
+                      <a:fillRect l="-4651" r="-2326" b="-6897"/>
+                    </a:stretch>
+                  </a:blipFill>
+                </p:spPr>
+                <p:txBody>
+                  <a:bodyPr/>
+                  <a:lstStyle/>
+                  <a:p>
+                    <a:r>
+                      <a:rPr lang="en-GB">
+                        <a:noFill/>
+                      </a:rPr>
+                      <a:t> </a:t>
+                    </a:r>
+                  </a:p>
+                </p:txBody>
+              </p:sp>
+            </mc:Fallback>
+          </mc:AlternateContent>
+        </p:grpSp>
+        <p:cxnSp>
+          <p:nvCxnSpPr>
+            <p:cNvPr id="22" name="Straight Arrow Connector 21">
+              <a:extLst>
+                <a:ext uri="{FF2B5EF4-FFF2-40B4-BE49-F238E27FC236}">
+                  <a16:creationId xmlns:a16="http://schemas.microsoft.com/office/drawing/2014/main" id="{0F78D6B2-7A1F-8B8E-E982-6EC5995BFE48}"/>
+                </a:ext>
+              </a:extLst>
+            </p:cNvPr>
+            <p:cNvCxnSpPr/>
+            <p:nvPr/>
+          </p:nvCxnSpPr>
+          <p:spPr>
+            <a:xfrm>
+              <a:off x="2042660" y="2571750"/>
+              <a:ext cx="754911" cy="0"/>
+            </a:xfrm>
+            <a:prstGeom prst="straightConnector1">
+              <a:avLst/>
+            </a:prstGeom>
+            <a:ln w="28575">
+              <a:solidFill>
+                <a:schemeClr val="tx1"/>
+              </a:solidFill>
+              <a:prstDash val="sysDot"/>
+              <a:tailEnd type="triangle"/>
+            </a:ln>
+          </p:spPr>
+          <p:style>
+            <a:lnRef idx="1">
+              <a:schemeClr val="accent1"/>
+            </a:lnRef>
+            <a:fillRef idx="0">
+              <a:schemeClr val="accent1"/>
+            </a:fillRef>
+            <a:effectRef idx="0">
+              <a:schemeClr val="accent1"/>
+            </a:effectRef>
+            <a:fontRef idx="minor">
+              <a:schemeClr val="tx1"/>
+            </a:fontRef>
+          </p:style>
+        </p:cxnSp>
+        <p:cxnSp>
+          <p:nvCxnSpPr>
+            <p:cNvPr id="23" name="Straight Arrow Connector 22">
+              <a:extLst>
+                <a:ext uri="{FF2B5EF4-FFF2-40B4-BE49-F238E27FC236}">
+                  <a16:creationId xmlns:a16="http://schemas.microsoft.com/office/drawing/2014/main" id="{E5A730E3-E10E-F150-16B5-ED59BF42BEAA}"/>
+                </a:ext>
+              </a:extLst>
+            </p:cNvPr>
+            <p:cNvCxnSpPr/>
+            <p:nvPr/>
+          </p:nvCxnSpPr>
+          <p:spPr>
+            <a:xfrm>
+              <a:off x="5560830" y="2571750"/>
+              <a:ext cx="754911" cy="0"/>
+            </a:xfrm>
+            <a:prstGeom prst="straightConnector1">
+              <a:avLst/>
+            </a:prstGeom>
+            <a:ln w="28575">
+              <a:solidFill>
+                <a:schemeClr val="tx1"/>
+              </a:solidFill>
+              <a:prstDash val="sysDot"/>
+              <a:tailEnd type="triangle"/>
+            </a:ln>
+          </p:spPr>
+          <p:style>
+            <a:lnRef idx="1">
+              <a:schemeClr val="accent1"/>
+            </a:lnRef>
+            <a:fillRef idx="0">
+              <a:schemeClr val="accent1"/>
+            </a:fillRef>
+            <a:effectRef idx="0">
+              <a:schemeClr val="accent1"/>
+            </a:effectRef>
+            <a:fontRef idx="minor">
+              <a:schemeClr val="tx1"/>
+            </a:fontRef>
+          </p:style>
+        </p:cxnSp>
+        <p:cxnSp>
+          <p:nvCxnSpPr>
+            <p:cNvPr id="24" name="Straight Arrow Connector 23">
+              <a:extLst>
+                <a:ext uri="{FF2B5EF4-FFF2-40B4-BE49-F238E27FC236}">
+                  <a16:creationId xmlns:a16="http://schemas.microsoft.com/office/drawing/2014/main" id="{5B70B3A1-B02F-EBA2-0D8F-FB58B1C88368}"/>
+                </a:ext>
+              </a:extLst>
+            </p:cNvPr>
+            <p:cNvCxnSpPr>
+              <a:cxnSpLocks/>
+              <a:stCxn id="13" idx="6"/>
+              <a:endCxn id="18" idx="2"/>
+            </p:cNvCxnSpPr>
+            <p:nvPr/>
+          </p:nvCxnSpPr>
+          <p:spPr>
+            <a:xfrm>
+              <a:off x="3392994" y="2579871"/>
+              <a:ext cx="1572413" cy="0"/>
+            </a:xfrm>
+            <a:prstGeom prst="straightConnector1">
+              <a:avLst/>
+            </a:prstGeom>
+            <a:ln w="28575">
+              <a:solidFill>
+                <a:schemeClr val="tx1"/>
+              </a:solidFill>
+              <a:tailEnd type="triangle"/>
+            </a:ln>
+          </p:spPr>
+          <p:style>
+            <a:lnRef idx="1">
+              <a:schemeClr val="accent1"/>
+            </a:lnRef>
+            <a:fillRef idx="0">
+              <a:schemeClr val="accent1"/>
+            </a:fillRef>
+            <a:effectRef idx="0">
+              <a:schemeClr val="accent1"/>
+            </a:effectRef>
+            <a:fontRef idx="minor">
+              <a:schemeClr val="tx1"/>
+            </a:fontRef>
+          </p:style>
+        </p:cxnSp>
+        <mc:AlternateContent xmlns:mc="http://schemas.openxmlformats.org/markup-compatibility/2006">
+          <mc:Choice xmlns:a14="http://schemas.microsoft.com/office/drawing/2010/main" Requires="a14">
+            <p:sp>
+              <p:nvSpPr>
+                <p:cNvPr id="27" name="TextBox 26">
+                  <a:extLst>
+                    <a:ext uri="{FF2B5EF4-FFF2-40B4-BE49-F238E27FC236}">
+                      <a16:creationId xmlns:a16="http://schemas.microsoft.com/office/drawing/2014/main" id="{88921A5D-7252-53FF-441C-112C1FDE6FD5}"/>
+                    </a:ext>
+                  </a:extLst>
+                </p:cNvPr>
+                <p:cNvSpPr txBox="1"/>
+                <p:nvPr/>
+              </p:nvSpPr>
+              <p:spPr>
+                <a:xfrm>
+                  <a:off x="3709325" y="2937535"/>
+                  <a:ext cx="362893" cy="439701"/>
+                </a:xfrm>
+                <a:prstGeom prst="roundRect">
+                  <a:avLst/>
+                </a:prstGeom>
+                <a:noFill/>
+                <a:ln w="19050">
+                  <a:noFill/>
+                </a:ln>
+              </p:spPr>
+              <p:txBody>
+                <a:bodyPr wrap="square" anchor="ctr">
+                  <a:spAutoFit/>
+                </a:bodyPr>
+                <a:lstStyle/>
+                <a:p>
+                  <a:pPr algn="ctr">
+                    <a:lnSpc>
+                      <a:spcPct val="114000"/>
+                    </a:lnSpc>
+                  </a:pPr>
+                  <a14:m>
+                    <m:oMathPara xmlns:m="http://schemas.openxmlformats.org/officeDocument/2006/math">
+                      <m:oMathParaPr>
+                        <m:jc m:val="center"/>
+                      </m:oMathParaPr>
+                      <m:oMath xmlns:m="http://schemas.openxmlformats.org/officeDocument/2006/math">
+                        <m:sSub>
+                          <m:sSubPr>
+                            <m:ctrlPr>
+                              <a:rPr lang="en-GB" i="1" smtClean="0">
+                                <a:solidFill>
+                                  <a:schemeClr val="tx1"/>
+                                </a:solidFill>
+                                <a:latin typeface="Cambria Math" panose="02040503050406030204" pitchFamily="18" charset="0"/>
+                              </a:rPr>
+                            </m:ctrlPr>
+                          </m:sSubPr>
+                          <m:e>
+                            <m:r>
+                              <a:rPr lang="en-US" b="0" i="1" smtClean="0">
+                                <a:solidFill>
+                                  <a:schemeClr val="tx1"/>
+                                </a:solidFill>
+                                <a:latin typeface="Cambria Math" panose="02040503050406030204" pitchFamily="18" charset="0"/>
+                              </a:rPr>
+                              <m:t>𝑎</m:t>
+                            </m:r>
+                          </m:e>
+                          <m:sub>
+                            <m:r>
+                              <a:rPr lang="en-US" b="0" i="1" smtClean="0">
+                                <a:solidFill>
+                                  <a:schemeClr val="tx1"/>
+                                </a:solidFill>
+                                <a:latin typeface="Cambria Math" panose="02040503050406030204" pitchFamily="18" charset="0"/>
+                              </a:rPr>
+                              <m:t>𝑡</m:t>
+                            </m:r>
+                          </m:sub>
+                        </m:sSub>
+                      </m:oMath>
+                    </m:oMathPara>
+                  </a14:m>
+                  <a:endParaRPr lang="en-GB" dirty="0">
+                    <a:solidFill>
+                      <a:schemeClr val="tx1"/>
+                    </a:solidFill>
+                  </a:endParaRPr>
+                </a:p>
+              </p:txBody>
+            </p:sp>
+          </mc:Choice>
+          <mc:Fallback>
+            <p:sp>
+              <p:nvSpPr>
+                <p:cNvPr id="27" name="TextBox 26">
+                  <a:extLst>
+                    <a:ext uri="{FF2B5EF4-FFF2-40B4-BE49-F238E27FC236}">
+                      <a16:creationId xmlns:a16="http://schemas.microsoft.com/office/drawing/2014/main" id="{88921A5D-7252-53FF-441C-112C1FDE6FD5}"/>
+                    </a:ext>
+                  </a:extLst>
+                </p:cNvPr>
+                <p:cNvSpPr txBox="1">
+                  <a:spLocks noRot="1" noChangeAspect="1" noMove="1" noResize="1" noEditPoints="1" noAdjustHandles="1" noChangeArrowheads="1" noChangeShapeType="1" noTextEdit="1"/>
+                </p:cNvSpPr>
+                <p:nvPr/>
+              </p:nvSpPr>
+              <p:spPr>
+                <a:xfrm>
+                  <a:off x="3709325" y="2937535"/>
+                  <a:ext cx="362893" cy="439701"/>
+                </a:xfrm>
+                <a:prstGeom prst="roundRect">
+                  <a:avLst/>
+                </a:prstGeom>
+                <a:blipFill>
+                  <a:blip r:embed="rId4"/>
+                  <a:stretch>
+                    <a:fillRect l="-6897"/>
+                  </a:stretch>
+                </a:blipFill>
+                <a:ln w="19050">
+                  <a:noFill/>
+                </a:ln>
+              </p:spPr>
+              <p:txBody>
+                <a:bodyPr/>
+                <a:lstStyle/>
+                <a:p>
+                  <a:r>
+                    <a:rPr lang="en-GB">
+                      <a:noFill/>
+                    </a:rPr>
+                    <a:t> </a:t>
+                  </a:r>
+                </a:p>
+              </p:txBody>
+            </p:sp>
+          </mc:Fallback>
+        </mc:AlternateContent>
+        <mc:AlternateContent xmlns:mc="http://schemas.openxmlformats.org/markup-compatibility/2006">
+          <mc:Choice xmlns:a14="http://schemas.microsoft.com/office/drawing/2010/main" Requires="a14">
+            <p:sp>
+              <p:nvSpPr>
+                <p:cNvPr id="28" name="TextBox 27">
+                  <a:extLst>
+                    <a:ext uri="{FF2B5EF4-FFF2-40B4-BE49-F238E27FC236}">
+                      <a16:creationId xmlns:a16="http://schemas.microsoft.com/office/drawing/2014/main" id="{9E7E7109-1AB3-F949-7BFF-C64A835F4E1A}"/>
+                    </a:ext>
+                  </a:extLst>
+                </p:cNvPr>
+                <p:cNvSpPr txBox="1"/>
+                <p:nvPr/>
+              </p:nvSpPr>
+              <p:spPr>
+                <a:xfrm>
+                  <a:off x="3408732" y="2174712"/>
+                  <a:ext cx="1482248" cy="408125"/>
+                </a:xfrm>
+                <a:prstGeom prst="rect">
+                  <a:avLst/>
+                </a:prstGeom>
+                <a:noFill/>
+              </p:spPr>
+              <p:txBody>
+                <a:bodyPr wrap="square">
+                  <a:spAutoFit/>
+                </a:bodyPr>
+                <a:lstStyle/>
+                <a:p>
+                  <a:pPr algn="ctr">
+                    <a:lnSpc>
+                      <a:spcPct val="114000"/>
+                    </a:lnSpc>
+                  </a:pPr>
+                  <a14:m>
+                    <m:oMathPara xmlns:m="http://schemas.openxmlformats.org/officeDocument/2006/math">
+                      <m:oMathParaPr>
+                        <m:jc m:val="centerGroup"/>
+                      </m:oMathParaPr>
+                      <m:oMath xmlns:m="http://schemas.openxmlformats.org/officeDocument/2006/math">
+                        <m:r>
+                          <a:rPr lang="en-GB" i="1" smtClean="0">
+                            <a:solidFill>
+                              <a:schemeClr val="tx1"/>
+                            </a:solidFill>
+                            <a:latin typeface="Cambria Math" panose="02040503050406030204" pitchFamily="18" charset="0"/>
+                            <a:ea typeface="Cambria Math" panose="02040503050406030204" pitchFamily="18" charset="0"/>
+                          </a:rPr>
+                          <m:t>ℙ</m:t>
+                        </m:r>
+                        <m:r>
+                          <a:rPr lang="en-US" b="0" i="1" smtClean="0">
+                            <a:solidFill>
+                              <a:schemeClr val="tx1"/>
+                            </a:solidFill>
+                            <a:latin typeface="Cambria Math" panose="02040503050406030204" pitchFamily="18" charset="0"/>
+                            <a:ea typeface="Cambria Math" panose="02040503050406030204" pitchFamily="18" charset="0"/>
+                          </a:rPr>
+                          <m:t>(</m:t>
+                        </m:r>
+                        <m:sSub>
+                          <m:sSubPr>
+                            <m:ctrlPr>
+                              <a:rPr lang="en-US" b="0" i="1" smtClean="0">
+                                <a:solidFill>
+                                  <a:schemeClr val="tx1"/>
+                                </a:solidFill>
+                                <a:latin typeface="Cambria Math" panose="02040503050406030204" pitchFamily="18" charset="0"/>
+                                <a:ea typeface="Cambria Math" panose="02040503050406030204" pitchFamily="18" charset="0"/>
+                              </a:rPr>
+                            </m:ctrlPr>
+                          </m:sSubPr>
+                          <m:e>
+                            <m:r>
+                              <a:rPr lang="en-US" b="0" i="1" smtClean="0">
+                                <a:solidFill>
+                                  <a:schemeClr val="tx1"/>
+                                </a:solidFill>
+                                <a:latin typeface="Cambria Math" panose="02040503050406030204" pitchFamily="18" charset="0"/>
+                                <a:ea typeface="Cambria Math" panose="02040503050406030204" pitchFamily="18" charset="0"/>
+                              </a:rPr>
+                              <m:t>𝑠</m:t>
+                            </m:r>
+                          </m:e>
+                          <m:sub>
+                            <m:r>
+                              <a:rPr lang="en-US" b="0" i="1" smtClean="0">
+                                <a:solidFill>
+                                  <a:schemeClr val="tx1"/>
+                                </a:solidFill>
+                                <a:latin typeface="Cambria Math" panose="02040503050406030204" pitchFamily="18" charset="0"/>
+                                <a:ea typeface="Cambria Math" panose="02040503050406030204" pitchFamily="18" charset="0"/>
+                              </a:rPr>
+                              <m:t>𝑡</m:t>
+                            </m:r>
+                            <m:r>
+                              <a:rPr lang="en-US" b="0" i="1" smtClean="0">
+                                <a:solidFill>
+                                  <a:schemeClr val="tx1"/>
+                                </a:solidFill>
+                                <a:latin typeface="Cambria Math" panose="02040503050406030204" pitchFamily="18" charset="0"/>
+                                <a:ea typeface="Cambria Math" panose="02040503050406030204" pitchFamily="18" charset="0"/>
+                              </a:rPr>
+                              <m:t>+1</m:t>
+                            </m:r>
+                          </m:sub>
+                        </m:sSub>
+                        <m:r>
+                          <a:rPr lang="en-US" b="0" i="1" smtClean="0">
+                            <a:solidFill>
+                              <a:schemeClr val="tx1"/>
+                            </a:solidFill>
+                            <a:latin typeface="Cambria Math" panose="02040503050406030204" pitchFamily="18" charset="0"/>
+                            <a:ea typeface="Cambria Math" panose="02040503050406030204" pitchFamily="18" charset="0"/>
+                          </a:rPr>
+                          <m:t>|</m:t>
+                        </m:r>
+                        <m:sSub>
+                          <m:sSubPr>
+                            <m:ctrlPr>
+                              <a:rPr lang="en-US" b="0" i="1" smtClean="0">
+                                <a:solidFill>
+                                  <a:schemeClr val="tx1"/>
+                                </a:solidFill>
+                                <a:latin typeface="Cambria Math" panose="02040503050406030204" pitchFamily="18" charset="0"/>
+                                <a:ea typeface="Cambria Math" panose="02040503050406030204" pitchFamily="18" charset="0"/>
+                              </a:rPr>
+                            </m:ctrlPr>
+                          </m:sSubPr>
+                          <m:e>
+                            <m:r>
+                              <a:rPr lang="en-US" b="0" i="1" smtClean="0">
+                                <a:solidFill>
+                                  <a:schemeClr val="tx1"/>
+                                </a:solidFill>
+                                <a:latin typeface="Cambria Math" panose="02040503050406030204" pitchFamily="18" charset="0"/>
+                                <a:ea typeface="Cambria Math" panose="02040503050406030204" pitchFamily="18" charset="0"/>
+                              </a:rPr>
+                              <m:t>𝑠</m:t>
+                            </m:r>
+                          </m:e>
+                          <m:sub>
+                            <m:r>
+                              <a:rPr lang="en-US" b="0" i="1" smtClean="0">
+                                <a:solidFill>
+                                  <a:schemeClr val="tx1"/>
+                                </a:solidFill>
+                                <a:latin typeface="Cambria Math" panose="02040503050406030204" pitchFamily="18" charset="0"/>
+                                <a:ea typeface="Cambria Math" panose="02040503050406030204" pitchFamily="18" charset="0"/>
+                              </a:rPr>
+                              <m:t>𝑡</m:t>
+                            </m:r>
+                          </m:sub>
+                        </m:sSub>
+                        <m:r>
+                          <a:rPr lang="en-US" b="0" i="1" smtClean="0">
+                            <a:solidFill>
+                              <a:schemeClr val="tx1"/>
+                            </a:solidFill>
+                            <a:latin typeface="Cambria Math" panose="02040503050406030204" pitchFamily="18" charset="0"/>
+                            <a:ea typeface="Cambria Math" panose="02040503050406030204" pitchFamily="18" charset="0"/>
+                          </a:rPr>
+                          <m:t>,</m:t>
+                        </m:r>
+                        <m:sSub>
+                          <m:sSubPr>
+                            <m:ctrlPr>
+                              <a:rPr lang="en-US" b="0" i="1" smtClean="0">
+                                <a:solidFill>
+                                  <a:schemeClr val="tx1"/>
+                                </a:solidFill>
+                                <a:latin typeface="Cambria Math" panose="02040503050406030204" pitchFamily="18" charset="0"/>
+                                <a:ea typeface="Cambria Math" panose="02040503050406030204" pitchFamily="18" charset="0"/>
+                              </a:rPr>
+                            </m:ctrlPr>
+                          </m:sSubPr>
+                          <m:e>
+                            <m:r>
+                              <a:rPr lang="en-US" b="0" i="1" smtClean="0">
+                                <a:solidFill>
+                                  <a:schemeClr val="tx1"/>
+                                </a:solidFill>
+                                <a:latin typeface="Cambria Math" panose="02040503050406030204" pitchFamily="18" charset="0"/>
+                                <a:ea typeface="Cambria Math" panose="02040503050406030204" pitchFamily="18" charset="0"/>
+                              </a:rPr>
+                              <m:t>𝑎</m:t>
+                            </m:r>
+                          </m:e>
+                          <m:sub>
+                            <m:r>
+                              <a:rPr lang="en-US" b="0" i="1" smtClean="0">
+                                <a:solidFill>
+                                  <a:schemeClr val="tx1"/>
+                                </a:solidFill>
+                                <a:latin typeface="Cambria Math" panose="02040503050406030204" pitchFamily="18" charset="0"/>
+                                <a:ea typeface="Cambria Math" panose="02040503050406030204" pitchFamily="18" charset="0"/>
+                              </a:rPr>
+                              <m:t>𝑡</m:t>
+                            </m:r>
+                          </m:sub>
+                        </m:sSub>
+                        <m:r>
+                          <a:rPr lang="en-US" b="0" i="1" smtClean="0">
+                            <a:solidFill>
+                              <a:schemeClr val="tx1"/>
+                            </a:solidFill>
+                            <a:latin typeface="Cambria Math" panose="02040503050406030204" pitchFamily="18" charset="0"/>
+                            <a:ea typeface="Cambria Math" panose="02040503050406030204" pitchFamily="18" charset="0"/>
+                          </a:rPr>
+                          <m:t>)</m:t>
+                        </m:r>
+                      </m:oMath>
+                    </m:oMathPara>
+                  </a14:m>
+                  <a:endParaRPr lang="en-GB" dirty="0">
+                    <a:solidFill>
+                      <a:schemeClr val="tx1"/>
+                    </a:solidFill>
+                  </a:endParaRPr>
+                </a:p>
+              </p:txBody>
+            </p:sp>
+          </mc:Choice>
+          <mc:Fallback>
+            <p:sp>
+              <p:nvSpPr>
+                <p:cNvPr id="28" name="TextBox 27">
+                  <a:extLst>
+                    <a:ext uri="{FF2B5EF4-FFF2-40B4-BE49-F238E27FC236}">
+                      <a16:creationId xmlns:a16="http://schemas.microsoft.com/office/drawing/2014/main" id="{9E7E7109-1AB3-F949-7BFF-C64A835F4E1A}"/>
+                    </a:ext>
+                  </a:extLst>
+                </p:cNvPr>
+                <p:cNvSpPr txBox="1">
+                  <a:spLocks noRot="1" noChangeAspect="1" noMove="1" noResize="1" noEditPoints="1" noAdjustHandles="1" noChangeArrowheads="1" noChangeShapeType="1" noTextEdit="1"/>
+                </p:cNvSpPr>
+                <p:nvPr/>
+              </p:nvSpPr>
+              <p:spPr>
+                <a:xfrm>
+                  <a:off x="3408732" y="2174712"/>
+                  <a:ext cx="1482248" cy="408125"/>
+                </a:xfrm>
+                <a:prstGeom prst="rect">
+                  <a:avLst/>
+                </a:prstGeom>
+                <a:blipFill>
+                  <a:blip r:embed="rId5"/>
+                  <a:stretch>
+                    <a:fillRect l="-1695" b="-6061"/>
+                  </a:stretch>
+                </a:blipFill>
+              </p:spPr>
+              <p:txBody>
+                <a:bodyPr/>
+                <a:lstStyle/>
+                <a:p>
+                  <a:r>
+                    <a:rPr lang="en-GB">
+                      <a:noFill/>
+                    </a:rPr>
+                    <a:t> </a:t>
+                  </a:r>
+                </a:p>
+              </p:txBody>
+            </p:sp>
+          </mc:Fallback>
+        </mc:AlternateContent>
+        <mc:AlternateContent xmlns:mc="http://schemas.openxmlformats.org/markup-compatibility/2006">
+          <mc:Choice xmlns:a14="http://schemas.microsoft.com/office/drawing/2010/main" Requires="a14">
+            <p:sp>
+              <p:nvSpPr>
+                <p:cNvPr id="49" name="TextBox 48">
+                  <a:extLst>
+                    <a:ext uri="{FF2B5EF4-FFF2-40B4-BE49-F238E27FC236}">
+                      <a16:creationId xmlns:a16="http://schemas.microsoft.com/office/drawing/2014/main" id="{03CDD8C2-7A76-5282-C04C-F7ECD6BDC8E7}"/>
+                    </a:ext>
+                  </a:extLst>
+                </p:cNvPr>
+                <p:cNvSpPr txBox="1"/>
+                <p:nvPr/>
+              </p:nvSpPr>
+              <p:spPr>
+                <a:xfrm>
+                  <a:off x="3273819" y="3582654"/>
+                  <a:ext cx="988692" cy="408125"/>
+                </a:xfrm>
+                <a:prstGeom prst="rect">
+                  <a:avLst/>
+                </a:prstGeom>
+                <a:noFill/>
+                <a:ln w="28575">
+                  <a:solidFill>
+                    <a:schemeClr val="accent6"/>
+                  </a:solidFill>
+                </a:ln>
+              </p:spPr>
+              <p:txBody>
+                <a:bodyPr wrap="square" anchor="ctr">
+                  <a:spAutoFit/>
+                </a:bodyPr>
+                <a:lstStyle/>
+                <a:p>
+                  <a:pPr algn="ctr">
+                    <a:lnSpc>
+                      <a:spcPct val="114000"/>
+                    </a:lnSpc>
+                  </a:pPr>
+                  <a14:m>
+                    <m:oMathPara xmlns:m="http://schemas.openxmlformats.org/officeDocument/2006/math">
+                      <m:oMathParaPr>
+                        <m:jc m:val="center"/>
+                      </m:oMathParaPr>
+                      <m:oMath xmlns:m="http://schemas.openxmlformats.org/officeDocument/2006/math">
+                        <m:r>
+                          <a:rPr lang="en-GB" i="1" smtClean="0">
+                            <a:solidFill>
+                              <a:schemeClr val="tx1"/>
+                            </a:solidFill>
+                            <a:latin typeface="Cambria Math" panose="02040503050406030204" pitchFamily="18" charset="0"/>
+                            <a:ea typeface="Cambria Math" panose="02040503050406030204" pitchFamily="18" charset="0"/>
+                          </a:rPr>
+                          <m:t>𝜋</m:t>
+                        </m:r>
+                        <m:r>
+                          <a:rPr lang="en-US" b="0" i="1" smtClean="0">
+                            <a:solidFill>
+                              <a:schemeClr val="tx1"/>
+                            </a:solidFill>
+                            <a:latin typeface="Cambria Math" panose="02040503050406030204" pitchFamily="18" charset="0"/>
+                            <a:ea typeface="Cambria Math" panose="02040503050406030204" pitchFamily="18" charset="0"/>
+                          </a:rPr>
+                          <m:t>(</m:t>
+                        </m:r>
+                        <m:sSub>
+                          <m:sSubPr>
+                            <m:ctrlPr>
+                              <a:rPr lang="en-US" b="0" i="1" smtClean="0">
+                                <a:solidFill>
+                                  <a:schemeClr val="tx1"/>
+                                </a:solidFill>
+                                <a:latin typeface="Cambria Math" panose="02040503050406030204" pitchFamily="18" charset="0"/>
+                                <a:ea typeface="Cambria Math" panose="02040503050406030204" pitchFamily="18" charset="0"/>
+                              </a:rPr>
+                            </m:ctrlPr>
+                          </m:sSubPr>
+                          <m:e>
+                            <m:r>
+                              <a:rPr lang="en-US" b="0" i="1" smtClean="0">
+                                <a:solidFill>
+                                  <a:schemeClr val="tx1"/>
+                                </a:solidFill>
+                                <a:latin typeface="Cambria Math" panose="02040503050406030204" pitchFamily="18" charset="0"/>
+                                <a:ea typeface="Cambria Math" panose="02040503050406030204" pitchFamily="18" charset="0"/>
+                              </a:rPr>
+                              <m:t>𝑎</m:t>
+                            </m:r>
+                          </m:e>
+                          <m:sub>
+                            <m:r>
+                              <a:rPr lang="en-US" b="0" i="1" smtClean="0">
+                                <a:solidFill>
+                                  <a:schemeClr val="tx1"/>
+                                </a:solidFill>
+                                <a:latin typeface="Cambria Math" panose="02040503050406030204" pitchFamily="18" charset="0"/>
+                                <a:ea typeface="Cambria Math" panose="02040503050406030204" pitchFamily="18" charset="0"/>
+                              </a:rPr>
+                              <m:t>𝑡</m:t>
+                            </m:r>
+                          </m:sub>
+                        </m:sSub>
+                        <m:r>
+                          <a:rPr lang="en-US" b="0" i="1" smtClean="0">
+                            <a:solidFill>
+                              <a:schemeClr val="tx1"/>
+                            </a:solidFill>
+                            <a:latin typeface="Cambria Math" panose="02040503050406030204" pitchFamily="18" charset="0"/>
+                            <a:ea typeface="Cambria Math" panose="02040503050406030204" pitchFamily="18" charset="0"/>
+                          </a:rPr>
+                          <m:t>|</m:t>
+                        </m:r>
+                        <m:sSub>
+                          <m:sSubPr>
+                            <m:ctrlPr>
+                              <a:rPr lang="en-US" b="0" i="1" smtClean="0">
+                                <a:solidFill>
+                                  <a:schemeClr val="tx1"/>
+                                </a:solidFill>
+                                <a:latin typeface="Cambria Math" panose="02040503050406030204" pitchFamily="18" charset="0"/>
+                                <a:ea typeface="Cambria Math" panose="02040503050406030204" pitchFamily="18" charset="0"/>
+                              </a:rPr>
+                            </m:ctrlPr>
+                          </m:sSubPr>
+                          <m:e>
+                            <m:r>
+                              <a:rPr lang="en-US" b="0" i="1" smtClean="0">
+                                <a:solidFill>
+                                  <a:schemeClr val="tx1"/>
+                                </a:solidFill>
+                                <a:latin typeface="Cambria Math" panose="02040503050406030204" pitchFamily="18" charset="0"/>
+                                <a:ea typeface="Cambria Math" panose="02040503050406030204" pitchFamily="18" charset="0"/>
+                              </a:rPr>
+                              <m:t>𝑠</m:t>
+                            </m:r>
+                          </m:e>
+                          <m:sub>
+                            <m:r>
+                              <a:rPr lang="en-US" b="0" i="1" smtClean="0">
+                                <a:solidFill>
+                                  <a:schemeClr val="tx1"/>
+                                </a:solidFill>
+                                <a:latin typeface="Cambria Math" panose="02040503050406030204" pitchFamily="18" charset="0"/>
+                                <a:ea typeface="Cambria Math" panose="02040503050406030204" pitchFamily="18" charset="0"/>
+                              </a:rPr>
+                              <m:t>𝑡</m:t>
+                            </m:r>
+                          </m:sub>
+                        </m:sSub>
+                        <m:r>
+                          <a:rPr lang="en-US" b="0" i="1" smtClean="0">
+                            <a:solidFill>
+                              <a:schemeClr val="tx1"/>
+                            </a:solidFill>
+                            <a:latin typeface="Cambria Math" panose="02040503050406030204" pitchFamily="18" charset="0"/>
+                            <a:ea typeface="Cambria Math" panose="02040503050406030204" pitchFamily="18" charset="0"/>
+                          </a:rPr>
+                          <m:t>)</m:t>
+                        </m:r>
+                      </m:oMath>
+                    </m:oMathPara>
+                  </a14:m>
+                  <a:endParaRPr lang="en-GB" dirty="0">
+                    <a:solidFill>
+                      <a:schemeClr val="tx1"/>
+                    </a:solidFill>
+                  </a:endParaRPr>
+                </a:p>
+              </p:txBody>
+            </p:sp>
+          </mc:Choice>
+          <mc:Fallback>
+            <p:sp>
+              <p:nvSpPr>
+                <p:cNvPr id="49" name="TextBox 48">
+                  <a:extLst>
+                    <a:ext uri="{FF2B5EF4-FFF2-40B4-BE49-F238E27FC236}">
+                      <a16:creationId xmlns:a16="http://schemas.microsoft.com/office/drawing/2014/main" id="{03CDD8C2-7A76-5282-C04C-F7ECD6BDC8E7}"/>
+                    </a:ext>
+                  </a:extLst>
+                </p:cNvPr>
+                <p:cNvSpPr txBox="1">
+                  <a:spLocks noRot="1" noChangeAspect="1" noMove="1" noResize="1" noEditPoints="1" noAdjustHandles="1" noChangeArrowheads="1" noChangeShapeType="1" noTextEdit="1"/>
+                </p:cNvSpPr>
+                <p:nvPr/>
+              </p:nvSpPr>
+              <p:spPr>
+                <a:xfrm>
+                  <a:off x="3273819" y="3582654"/>
+                  <a:ext cx="988692" cy="408125"/>
+                </a:xfrm>
+                <a:prstGeom prst="rect">
+                  <a:avLst/>
+                </a:prstGeom>
+                <a:blipFill>
+                  <a:blip r:embed="rId6"/>
+                  <a:stretch>
+                    <a:fillRect b="-2857"/>
+                  </a:stretch>
+                </a:blipFill>
+                <a:ln w="28575">
+                  <a:solidFill>
+                    <a:schemeClr val="accent6"/>
+                  </a:solidFill>
+                </a:ln>
+              </p:spPr>
+              <p:txBody>
+                <a:bodyPr/>
+                <a:lstStyle/>
+                <a:p>
+                  <a:r>
+                    <a:rPr lang="en-GB">
+                      <a:noFill/>
+                    </a:rPr>
+                    <a:t> </a:t>
+                  </a:r>
+                </a:p>
+              </p:txBody>
+            </p:sp>
+          </mc:Fallback>
+        </mc:AlternateContent>
+        <p:cxnSp>
+          <p:nvCxnSpPr>
+            <p:cNvPr id="58" name="Straight Arrow Connector 57">
+              <a:extLst>
+                <a:ext uri="{FF2B5EF4-FFF2-40B4-BE49-F238E27FC236}">
+                  <a16:creationId xmlns:a16="http://schemas.microsoft.com/office/drawing/2014/main" id="{9C8E8C20-B235-B760-D144-E78DC10973AD}"/>
+                </a:ext>
+              </a:extLst>
+            </p:cNvPr>
+            <p:cNvCxnSpPr/>
+            <p:nvPr/>
+          </p:nvCxnSpPr>
+          <p:spPr>
+            <a:xfrm flipH="1" flipV="1">
+              <a:off x="4027660" y="2619202"/>
+              <a:ext cx="1" cy="956315"/>
+            </a:xfrm>
+            <a:prstGeom prst="straightConnector1">
+              <a:avLst/>
+            </a:prstGeom>
+            <a:ln w="28575">
+              <a:solidFill>
+                <a:schemeClr val="accent6"/>
+              </a:solidFill>
+              <a:tailEnd type="triangle"/>
+            </a:ln>
+          </p:spPr>
+          <p:style>
+            <a:lnRef idx="1">
+              <a:schemeClr val="accent1"/>
+            </a:lnRef>
+            <a:fillRef idx="0">
+              <a:schemeClr val="accent1"/>
+            </a:fillRef>
+            <a:effectRef idx="0">
+              <a:schemeClr val="accent1"/>
+            </a:effectRef>
+            <a:fontRef idx="minor">
+              <a:schemeClr val="tx1"/>
+            </a:fontRef>
+          </p:style>
+        </p:cxnSp>
+        <mc:AlternateContent xmlns:mc="http://schemas.openxmlformats.org/markup-compatibility/2006">
+          <mc:Choice xmlns:a14="http://schemas.microsoft.com/office/drawing/2010/main" Requires="a14">
+            <p:sp>
+              <p:nvSpPr>
+                <p:cNvPr id="59" name="TextBox 58">
+                  <a:extLst>
+                    <a:ext uri="{FF2B5EF4-FFF2-40B4-BE49-F238E27FC236}">
+                      <a16:creationId xmlns:a16="http://schemas.microsoft.com/office/drawing/2014/main" id="{ADBC4B18-31B4-D88A-1DB3-7B17FD02E8E6}"/>
+                    </a:ext>
+                  </a:extLst>
+                </p:cNvPr>
+                <p:cNvSpPr txBox="1"/>
+                <p:nvPr/>
+              </p:nvSpPr>
+              <p:spPr>
+                <a:xfrm>
+                  <a:off x="4600829" y="2944675"/>
+                  <a:ext cx="362893" cy="439701"/>
+                </a:xfrm>
+                <a:prstGeom prst="roundRect">
+                  <a:avLst/>
+                </a:prstGeom>
+                <a:noFill/>
+                <a:ln w="19050">
+                  <a:noFill/>
+                </a:ln>
+              </p:spPr>
+              <p:txBody>
+                <a:bodyPr wrap="square" anchor="ctr">
+                  <a:spAutoFit/>
+                </a:bodyPr>
+                <a:lstStyle/>
+                <a:p>
+                  <a:pPr algn="ctr">
+                    <a:lnSpc>
+                      <a:spcPct val="114000"/>
+                    </a:lnSpc>
+                  </a:pPr>
+                  <a14:m>
+                    <m:oMathPara xmlns:m="http://schemas.openxmlformats.org/officeDocument/2006/math">
+                      <m:oMathParaPr>
+                        <m:jc m:val="center"/>
+                      </m:oMathParaPr>
+                      <m:oMath xmlns:m="http://schemas.openxmlformats.org/officeDocument/2006/math">
+                        <m:sSub>
+                          <m:sSubPr>
+                            <m:ctrlPr>
+                              <a:rPr lang="en-GB" i="1" smtClean="0">
+                                <a:solidFill>
+                                  <a:schemeClr val="tx1"/>
+                                </a:solidFill>
+                                <a:latin typeface="Cambria Math" panose="02040503050406030204" pitchFamily="18" charset="0"/>
+                              </a:rPr>
+                            </m:ctrlPr>
+                          </m:sSubPr>
+                          <m:e>
+                            <m:r>
+                              <a:rPr lang="en-US" b="0" i="1" smtClean="0">
+                                <a:solidFill>
+                                  <a:schemeClr val="tx1"/>
+                                </a:solidFill>
+                                <a:latin typeface="Cambria Math" panose="02040503050406030204" pitchFamily="18" charset="0"/>
+                              </a:rPr>
+                              <m:t>𝑟</m:t>
+                            </m:r>
+                          </m:e>
+                          <m:sub>
+                            <m:r>
+                              <a:rPr lang="en-US" b="0" i="1" smtClean="0">
+                                <a:solidFill>
+                                  <a:schemeClr val="tx1"/>
+                                </a:solidFill>
+                                <a:latin typeface="Cambria Math" panose="02040503050406030204" pitchFamily="18" charset="0"/>
+                              </a:rPr>
+                              <m:t>𝑡</m:t>
+                            </m:r>
+                          </m:sub>
+                        </m:sSub>
+                      </m:oMath>
+                    </m:oMathPara>
+                  </a14:m>
+                  <a:endParaRPr lang="en-GB" dirty="0">
+                    <a:solidFill>
+                      <a:schemeClr val="tx1"/>
+                    </a:solidFill>
+                  </a:endParaRPr>
+                </a:p>
+              </p:txBody>
+            </p:sp>
+          </mc:Choice>
+          <mc:Fallback>
+            <p:sp>
+              <p:nvSpPr>
+                <p:cNvPr id="59" name="TextBox 58">
+                  <a:extLst>
+                    <a:ext uri="{FF2B5EF4-FFF2-40B4-BE49-F238E27FC236}">
+                      <a16:creationId xmlns:a16="http://schemas.microsoft.com/office/drawing/2014/main" id="{ADBC4B18-31B4-D88A-1DB3-7B17FD02E8E6}"/>
+                    </a:ext>
+                  </a:extLst>
+                </p:cNvPr>
+                <p:cNvSpPr txBox="1">
+                  <a:spLocks noRot="1" noChangeAspect="1" noMove="1" noResize="1" noEditPoints="1" noAdjustHandles="1" noChangeArrowheads="1" noChangeShapeType="1" noTextEdit="1"/>
+                </p:cNvSpPr>
+                <p:nvPr/>
+              </p:nvSpPr>
+              <p:spPr>
+                <a:xfrm>
+                  <a:off x="4600829" y="2944675"/>
+                  <a:ext cx="362893" cy="439701"/>
+                </a:xfrm>
+                <a:prstGeom prst="roundRect">
+                  <a:avLst/>
+                </a:prstGeom>
+                <a:blipFill>
+                  <a:blip r:embed="rId7"/>
+                  <a:stretch>
+                    <a:fillRect/>
+                  </a:stretch>
+                </a:blipFill>
+                <a:ln w="19050">
+                  <a:noFill/>
+                </a:ln>
+              </p:spPr>
+              <p:txBody>
+                <a:bodyPr/>
+                <a:lstStyle/>
+                <a:p>
+                  <a:r>
+                    <a:rPr lang="en-GB">
+                      <a:noFill/>
+                    </a:rPr>
+                    <a:t> </a:t>
+                  </a:r>
+                </a:p>
+              </p:txBody>
+            </p:sp>
+          </mc:Fallback>
+        </mc:AlternateContent>
+        <p:cxnSp>
+          <p:nvCxnSpPr>
+            <p:cNvPr id="60" name="Straight Arrow Connector 59">
+              <a:extLst>
+                <a:ext uri="{FF2B5EF4-FFF2-40B4-BE49-F238E27FC236}">
+                  <a16:creationId xmlns:a16="http://schemas.microsoft.com/office/drawing/2014/main" id="{500B14B6-7921-C7C1-07E6-93B4A88A18BC}"/>
+                </a:ext>
+              </a:extLst>
+            </p:cNvPr>
+            <p:cNvCxnSpPr>
+              <a:cxnSpLocks/>
+            </p:cNvCxnSpPr>
+            <p:nvPr/>
+          </p:nvCxnSpPr>
+          <p:spPr>
+            <a:xfrm>
+              <a:off x="4597315" y="2628025"/>
+              <a:ext cx="1" cy="959853"/>
+            </a:xfrm>
+            <a:prstGeom prst="straightConnector1">
+              <a:avLst/>
+            </a:prstGeom>
+            <a:ln w="28575">
+              <a:solidFill>
+                <a:srgbClr val="0065BD"/>
+              </a:solidFill>
+              <a:tailEnd type="triangle"/>
+            </a:ln>
+          </p:spPr>
+          <p:style>
+            <a:lnRef idx="1">
+              <a:schemeClr val="accent1"/>
+            </a:lnRef>
+            <a:fillRef idx="0">
+              <a:schemeClr val="accent1"/>
+            </a:fillRef>
+            <a:effectRef idx="0">
+              <a:schemeClr val="accent1"/>
+            </a:effectRef>
+            <a:fontRef idx="minor">
+              <a:schemeClr val="tx1"/>
+            </a:fontRef>
+          </p:style>
+        </p:cxnSp>
+        <p:cxnSp>
+          <p:nvCxnSpPr>
+            <p:cNvPr id="67" name="Straight Arrow Connector 66">
+              <a:extLst>
+                <a:ext uri="{FF2B5EF4-FFF2-40B4-BE49-F238E27FC236}">
+                  <a16:creationId xmlns:a16="http://schemas.microsoft.com/office/drawing/2014/main" id="{E94BE973-FE50-681E-6B6A-6B92DE66B201}"/>
+                </a:ext>
+              </a:extLst>
+            </p:cNvPr>
+            <p:cNvCxnSpPr>
+              <a:cxnSpLocks/>
+              <a:stCxn id="13" idx="4"/>
+            </p:cNvCxnSpPr>
+            <p:nvPr/>
+          </p:nvCxnSpPr>
+          <p:spPr>
+            <a:xfrm>
+              <a:off x="3095283" y="2875318"/>
+              <a:ext cx="357071" cy="707336"/>
+            </a:xfrm>
+            <a:prstGeom prst="straightConnector1">
+              <a:avLst/>
+            </a:prstGeom>
+            <a:ln w="28575">
+              <a:solidFill>
+                <a:srgbClr val="0065BD"/>
+              </a:solidFill>
+              <a:tailEnd type="triangle"/>
+            </a:ln>
+          </p:spPr>
+          <p:style>
+            <a:lnRef idx="1">
+              <a:schemeClr val="accent1"/>
+            </a:lnRef>
+            <a:fillRef idx="0">
+              <a:schemeClr val="accent1"/>
+            </a:fillRef>
+            <a:effectRef idx="0">
+              <a:schemeClr val="accent1"/>
+            </a:effectRef>
+            <a:fontRef idx="minor">
+              <a:schemeClr val="tx1"/>
+            </a:fontRef>
+          </p:style>
+        </p:cxnSp>
+      </p:grpSp>
     </p:spTree>
     <p:extLst>
       <p:ext uri="{BB962C8B-B14F-4D97-AF65-F5344CB8AC3E}">

</xml_diff>